<commit_message>
Added Great Migration slides
</commit_message>
<xml_diff>
--- a/HSTR121/ppts/RockEmerges.pptx
+++ b/HSTR121/ppts/RockEmerges.pptx
@@ -5,7 +5,7 @@
     <p:sldMasterId id="2147483648" r:id="rId1"/>
   </p:sldMasterIdLst>
   <p:notesMasterIdLst>
-    <p:notesMasterId r:id="rId20"/>
+    <p:notesMasterId r:id="rId22"/>
   </p:notesMasterIdLst>
   <p:sldIdLst>
     <p:sldId id="256" r:id="rId2"/>
@@ -14,18 +14,20 @@
     <p:sldId id="267" r:id="rId5"/>
     <p:sldId id="268" r:id="rId6"/>
     <p:sldId id="269" r:id="rId7"/>
-    <p:sldId id="264" r:id="rId8"/>
-    <p:sldId id="265" r:id="rId9"/>
-    <p:sldId id="270" r:id="rId10"/>
-    <p:sldId id="271" r:id="rId11"/>
-    <p:sldId id="275" r:id="rId12"/>
-    <p:sldId id="261" r:id="rId13"/>
-    <p:sldId id="279" r:id="rId14"/>
-    <p:sldId id="262" r:id="rId15"/>
-    <p:sldId id="263" r:id="rId16"/>
-    <p:sldId id="273" r:id="rId17"/>
-    <p:sldId id="274" r:id="rId18"/>
-    <p:sldId id="278" r:id="rId19"/>
+    <p:sldId id="280" r:id="rId8"/>
+    <p:sldId id="281" r:id="rId9"/>
+    <p:sldId id="264" r:id="rId10"/>
+    <p:sldId id="265" r:id="rId11"/>
+    <p:sldId id="270" r:id="rId12"/>
+    <p:sldId id="271" r:id="rId13"/>
+    <p:sldId id="275" r:id="rId14"/>
+    <p:sldId id="261" r:id="rId15"/>
+    <p:sldId id="279" r:id="rId16"/>
+    <p:sldId id="263" r:id="rId17"/>
+    <p:sldId id="262" r:id="rId18"/>
+    <p:sldId id="273" r:id="rId19"/>
+    <p:sldId id="274" r:id="rId20"/>
+    <p:sldId id="278" r:id="rId21"/>
   </p:sldIdLst>
   <p:sldSz cx="12192000" cy="6858000"/>
   <p:notesSz cx="6858000" cy="9144000"/>
@@ -218,7 +220,7 @@
           <a:p>
             <a:fld id="{C291D997-D7C6-495A-ADFE-01BE34D636D4}" type="datetimeFigureOut">
               <a:rPr lang="en-US" smtClean="0"/>
-              <a:t>1/12/2018</a:t>
+              <a:t>1/16/2018</a:t>
             </a:fld>
             <a:endParaRPr lang="en-US"/>
           </a:p>
@@ -634,22 +636,8 @@
           <a:lstStyle/>
           <a:p>
             <a:r>
-              <a:rPr lang="en-US" dirty="0"/>
-              <a:t>https://commons.wikimedia.org/wiki/File%3AEducational_separation_in_the_US_prior_to_Brown_Map.svg</a:t>
-            </a:r>
-          </a:p>
-          <a:p>
-            <a:r>
-              <a:rPr lang="en-US" dirty="0"/>
-              <a:t>By </a:t>
-            </a:r>
-            <a:r>
-              <a:rPr lang="en-US" dirty="0" err="1"/>
-              <a:t>User:King_of_Hearts</a:t>
-            </a:r>
-            <a:r>
-              <a:rPr lang="en-US" dirty="0"/>
-              <a:t> [GFDL (http://www.gnu.org/copyleft/fdl.html) or CC-BY-SA-3.0 (http://creativecommons.org/licenses/by-sa/3.0/)], via Wikimedia Commons</a:t>
+              <a:rPr lang="en-CA"/>
+              <a:t>Source: https://upload.wikimedia.org/wikipedia/commons/8/8b/Percentage_of_African_American_population_living_in_the_American_South.png</a:t>
             </a:r>
           </a:p>
         </p:txBody>
@@ -671,7 +659,7 @@
           <a:p>
             <a:fld id="{E607D032-B2FA-4B67-8888-9E3607AEC55C}" type="slidenum">
               <a:rPr lang="en-US" smtClean="0"/>
-              <a:t>7</a:t>
+              <a:t>8</a:t>
             </a:fld>
             <a:endParaRPr lang="en-US"/>
           </a:p>
@@ -680,7 +668,7 @@
     </p:spTree>
     <p:extLst>
       <p:ext uri="{BB962C8B-B14F-4D97-AF65-F5344CB8AC3E}">
-        <p14:creationId xmlns:p14="http://schemas.microsoft.com/office/powerpoint/2010/main" val="329806295"/>
+        <p14:creationId xmlns:p14="http://schemas.microsoft.com/office/powerpoint/2010/main" val="716350952"/>
       </p:ext>
     </p:extLst>
   </p:cSld>
@@ -736,13 +724,21 @@
           <a:p>
             <a:r>
               <a:rPr lang="en-US" dirty="0"/>
-              <a:t>https://commons.wikimedia.org/wiki/File%3AUS_Birth_Rates.svg</a:t>
-            </a:r>
-          </a:p>
-          <a:p>
-            <a:r>
-              <a:rPr lang="en-US" dirty="0"/>
-              <a:t>By Saiarcot895 (Own work) [CC0], via Wikimedia Commons</a:t>
+              <a:t>https://commons.wikimedia.org/wiki/File%3AEducational_separation_in_the_US_prior_to_Brown_Map.svg</a:t>
+            </a:r>
+          </a:p>
+          <a:p>
+            <a:r>
+              <a:rPr lang="en-US" dirty="0"/>
+              <a:t>By </a:t>
+            </a:r>
+            <a:r>
+              <a:rPr lang="en-US" dirty="0" err="1"/>
+              <a:t>User:King_of_Hearts</a:t>
+            </a:r>
+            <a:r>
+              <a:rPr lang="en-US" dirty="0"/>
+              <a:t> [GFDL (http://www.gnu.org/copyleft/fdl.html) or CC-BY-SA-3.0 (http://creativecommons.org/licenses/by-sa/3.0/)], via Wikimedia Commons</a:t>
             </a:r>
           </a:p>
         </p:txBody>
@@ -764,7 +760,100 @@
           <a:p>
             <a:fld id="{E607D032-B2FA-4B67-8888-9E3607AEC55C}" type="slidenum">
               <a:rPr lang="en-US" smtClean="0"/>
-              <a:t>8</a:t>
+              <a:t>9</a:t>
+            </a:fld>
+            <a:endParaRPr lang="en-US"/>
+          </a:p>
+        </p:txBody>
+      </p:sp>
+    </p:spTree>
+    <p:extLst>
+      <p:ext uri="{BB962C8B-B14F-4D97-AF65-F5344CB8AC3E}">
+        <p14:creationId xmlns:p14="http://schemas.microsoft.com/office/powerpoint/2010/main" val="329806295"/>
+      </p:ext>
+    </p:extLst>
+  </p:cSld>
+  <p:clrMapOvr>
+    <a:masterClrMapping/>
+  </p:clrMapOvr>
+</p:notes>
+</file>
+
+<file path=ppt/notesSlides/notesSlide4.xml><?xml version="1.0" encoding="utf-8"?>
+<p:notes xmlns:a="http://schemas.openxmlformats.org/drawingml/2006/main" xmlns:r="http://schemas.openxmlformats.org/officeDocument/2006/relationships" xmlns:p="http://schemas.openxmlformats.org/presentationml/2006/main">
+  <p:cSld>
+    <p:spTree>
+      <p:nvGrpSpPr>
+        <p:cNvPr id="1" name=""/>
+        <p:cNvGrpSpPr/>
+        <p:nvPr/>
+      </p:nvGrpSpPr>
+      <p:grpSpPr>
+        <a:xfrm>
+          <a:off x="0" y="0"/>
+          <a:ext cx="0" cy="0"/>
+          <a:chOff x="0" y="0"/>
+          <a:chExt cx="0" cy="0"/>
+        </a:xfrm>
+      </p:grpSpPr>
+      <p:sp>
+        <p:nvSpPr>
+          <p:cNvPr id="2" name="Slide Image Placeholder 1"/>
+          <p:cNvSpPr>
+            <a:spLocks noGrp="1" noRot="1" noChangeAspect="1"/>
+          </p:cNvSpPr>
+          <p:nvPr>
+            <p:ph type="sldImg"/>
+          </p:nvPr>
+        </p:nvSpPr>
+        <p:spPr/>
+      </p:sp>
+      <p:sp>
+        <p:nvSpPr>
+          <p:cNvPr id="3" name="Notes Placeholder 2"/>
+          <p:cNvSpPr>
+            <a:spLocks noGrp="1"/>
+          </p:cNvSpPr>
+          <p:nvPr>
+            <p:ph type="body" idx="1"/>
+          </p:nvPr>
+        </p:nvSpPr>
+        <p:spPr/>
+        <p:txBody>
+          <a:bodyPr/>
+          <a:lstStyle/>
+          <a:p>
+            <a:r>
+              <a:rPr lang="en-US" dirty="0"/>
+              <a:t>https://commons.wikimedia.org/wiki/File%3AUS_Birth_Rates.svg</a:t>
+            </a:r>
+          </a:p>
+          <a:p>
+            <a:r>
+              <a:rPr lang="en-US" dirty="0"/>
+              <a:t>By Saiarcot895 (Own work) [CC0], via Wikimedia Commons</a:t>
+            </a:r>
+          </a:p>
+        </p:txBody>
+      </p:sp>
+      <p:sp>
+        <p:nvSpPr>
+          <p:cNvPr id="4" name="Slide Number Placeholder 3"/>
+          <p:cNvSpPr>
+            <a:spLocks noGrp="1"/>
+          </p:cNvSpPr>
+          <p:nvPr>
+            <p:ph type="sldNum" sz="quarter" idx="10"/>
+          </p:nvPr>
+        </p:nvSpPr>
+        <p:spPr/>
+        <p:txBody>
+          <a:bodyPr/>
+          <a:lstStyle/>
+          <a:p>
+            <a:fld id="{E607D032-B2FA-4B67-8888-9E3607AEC55C}" type="slidenum">
+              <a:rPr lang="en-US" smtClean="0"/>
+              <a:t>10</a:t>
             </a:fld>
             <a:endParaRPr lang="en-US"/>
           </a:p>
@@ -912,7 +1001,7 @@
           <a:p>
             <a:fld id="{FBF630C0-B0E4-4EC2-AB0C-BE44B3506280}" type="datetimeFigureOut">
               <a:rPr lang="en-US" smtClean="0"/>
-              <a:t>1/12/2018</a:t>
+              <a:t>1/16/2018</a:t>
             </a:fld>
             <a:endParaRPr lang="en-US"/>
           </a:p>
@@ -1080,7 +1169,7 @@
           <a:p>
             <a:fld id="{FBF630C0-B0E4-4EC2-AB0C-BE44B3506280}" type="datetimeFigureOut">
               <a:rPr lang="en-US" smtClean="0"/>
-              <a:t>1/12/2018</a:t>
+              <a:t>1/16/2018</a:t>
             </a:fld>
             <a:endParaRPr lang="en-US"/>
           </a:p>
@@ -1258,7 +1347,7 @@
           <a:p>
             <a:fld id="{FBF630C0-B0E4-4EC2-AB0C-BE44B3506280}" type="datetimeFigureOut">
               <a:rPr lang="en-US" smtClean="0"/>
-              <a:t>1/12/2018</a:t>
+              <a:t>1/16/2018</a:t>
             </a:fld>
             <a:endParaRPr lang="en-US"/>
           </a:p>
@@ -1426,7 +1515,7 @@
           <a:p>
             <a:fld id="{FBF630C0-B0E4-4EC2-AB0C-BE44B3506280}" type="datetimeFigureOut">
               <a:rPr lang="en-US" smtClean="0"/>
-              <a:t>1/12/2018</a:t>
+              <a:t>1/16/2018</a:t>
             </a:fld>
             <a:endParaRPr lang="en-US"/>
           </a:p>
@@ -1671,7 +1760,7 @@
           <a:p>
             <a:fld id="{FBF630C0-B0E4-4EC2-AB0C-BE44B3506280}" type="datetimeFigureOut">
               <a:rPr lang="en-US" smtClean="0"/>
-              <a:t>1/12/2018</a:t>
+              <a:t>1/16/2018</a:t>
             </a:fld>
             <a:endParaRPr lang="en-US"/>
           </a:p>
@@ -1900,7 +1989,7 @@
           <a:p>
             <a:fld id="{FBF630C0-B0E4-4EC2-AB0C-BE44B3506280}" type="datetimeFigureOut">
               <a:rPr lang="en-US" smtClean="0"/>
-              <a:t>1/12/2018</a:t>
+              <a:t>1/16/2018</a:t>
             </a:fld>
             <a:endParaRPr lang="en-US"/>
           </a:p>
@@ -2264,7 +2353,7 @@
           <a:p>
             <a:fld id="{FBF630C0-B0E4-4EC2-AB0C-BE44B3506280}" type="datetimeFigureOut">
               <a:rPr lang="en-US" smtClean="0"/>
-              <a:t>1/12/2018</a:t>
+              <a:t>1/16/2018</a:t>
             </a:fld>
             <a:endParaRPr lang="en-US"/>
           </a:p>
@@ -2381,7 +2470,7 @@
           <a:p>
             <a:fld id="{FBF630C0-B0E4-4EC2-AB0C-BE44B3506280}" type="datetimeFigureOut">
               <a:rPr lang="en-US" smtClean="0"/>
-              <a:t>1/12/2018</a:t>
+              <a:t>1/16/2018</a:t>
             </a:fld>
             <a:endParaRPr lang="en-US"/>
           </a:p>
@@ -2476,7 +2565,7 @@
           <a:p>
             <a:fld id="{FBF630C0-B0E4-4EC2-AB0C-BE44B3506280}" type="datetimeFigureOut">
               <a:rPr lang="en-US" smtClean="0"/>
-              <a:t>1/12/2018</a:t>
+              <a:t>1/16/2018</a:t>
             </a:fld>
             <a:endParaRPr lang="en-US"/>
           </a:p>
@@ -2751,7 +2840,7 @@
           <a:p>
             <a:fld id="{FBF630C0-B0E4-4EC2-AB0C-BE44B3506280}" type="datetimeFigureOut">
               <a:rPr lang="en-US" smtClean="0"/>
-              <a:t>1/12/2018</a:t>
+              <a:t>1/16/2018</a:t>
             </a:fld>
             <a:endParaRPr lang="en-US"/>
           </a:p>
@@ -3003,7 +3092,7 @@
           <a:p>
             <a:fld id="{FBF630C0-B0E4-4EC2-AB0C-BE44B3506280}" type="datetimeFigureOut">
               <a:rPr lang="en-US" smtClean="0"/>
-              <a:t>1/12/2018</a:t>
+              <a:t>1/16/2018</a:t>
             </a:fld>
             <a:endParaRPr lang="en-US"/>
           </a:p>
@@ -3224,7 +3313,7 @@
           <a:p>
             <a:fld id="{FBF630C0-B0E4-4EC2-AB0C-BE44B3506280}" type="datetimeFigureOut">
               <a:rPr lang="en-US" smtClean="0"/>
-              <a:t>1/12/2018</a:t>
+              <a:t>1/16/2018</a:t>
             </a:fld>
             <a:endParaRPr lang="en-US"/>
           </a:p>
@@ -3732,6 +3821,220 @@
       </p:grpSpPr>
       <p:sp>
         <p:nvSpPr>
+          <p:cNvPr id="2" name="Title 1"/>
+          <p:cNvSpPr>
+            <a:spLocks noGrp="1"/>
+          </p:cNvSpPr>
+          <p:nvPr>
+            <p:ph type="title"/>
+          </p:nvPr>
+        </p:nvSpPr>
+        <p:spPr>
+          <a:xfrm>
+            <a:off x="810904" y="1"/>
+            <a:ext cx="10515600" cy="928048"/>
+          </a:xfrm>
+        </p:spPr>
+        <p:txBody>
+          <a:bodyPr/>
+          <a:lstStyle/>
+          <a:p>
+            <a:pPr algn="ctr"/>
+            <a:r>
+              <a:rPr lang="en-US" b="1" dirty="0"/>
+              <a:t>Post World War II Baby Boom, the last</a:t>
+            </a:r>
+          </a:p>
+        </p:txBody>
+      </p:sp>
+      <p:pic>
+        <p:nvPicPr>
+          <p:cNvPr id="4" name="Content Placeholder 3"/>
+          <p:cNvPicPr>
+            <a:picLocks noGrp="1" noChangeAspect="1"/>
+          </p:cNvPicPr>
+          <p:nvPr>
+            <p:ph idx="1"/>
+          </p:nvPr>
+        </p:nvPicPr>
+        <p:blipFill>
+          <a:blip r:embed="rId3">
+            <a:extLst>
+              <a:ext uri="{28A0092B-C50C-407E-A947-70E740481C1C}">
+                <a14:useLocalDpi xmlns:a14="http://schemas.microsoft.com/office/drawing/2010/main" val="0"/>
+              </a:ext>
+            </a:extLst>
+          </a:blip>
+          <a:stretch>
+            <a:fillRect/>
+          </a:stretch>
+        </p:blipFill>
+        <p:spPr>
+          <a:xfrm>
+            <a:off x="889948" y="828811"/>
+            <a:ext cx="10412104" cy="6029189"/>
+          </a:xfrm>
+        </p:spPr>
+      </p:pic>
+    </p:spTree>
+    <p:extLst>
+      <p:ext uri="{BB962C8B-B14F-4D97-AF65-F5344CB8AC3E}">
+        <p14:creationId xmlns:p14="http://schemas.microsoft.com/office/powerpoint/2010/main" val="2228129065"/>
+      </p:ext>
+    </p:extLst>
+  </p:cSld>
+  <p:clrMapOvr>
+    <a:masterClrMapping/>
+  </p:clrMapOvr>
+</p:sld>
+</file>
+
+<file path=ppt/slides/slide11.xml><?xml version="1.0" encoding="utf-8"?>
+<p:sld xmlns:a="http://schemas.openxmlformats.org/drawingml/2006/main" xmlns:r="http://schemas.openxmlformats.org/officeDocument/2006/relationships" xmlns:p="http://schemas.openxmlformats.org/presentationml/2006/main">
+  <p:cSld>
+    <p:spTree>
+      <p:nvGrpSpPr>
+        <p:cNvPr id="1" name=""/>
+        <p:cNvGrpSpPr/>
+        <p:nvPr/>
+      </p:nvGrpSpPr>
+      <p:grpSpPr>
+        <a:xfrm>
+          <a:off x="0" y="0"/>
+          <a:ext cx="0" cy="0"/>
+          <a:chOff x="0" y="0"/>
+          <a:chExt cx="0" cy="0"/>
+        </a:xfrm>
+      </p:grpSpPr>
+      <p:sp>
+        <p:nvSpPr>
+          <p:cNvPr id="2" name="Content Placeholder 1"/>
+          <p:cNvSpPr>
+            <a:spLocks noGrp="1"/>
+          </p:cNvSpPr>
+          <p:nvPr>
+            <p:ph idx="1"/>
+          </p:nvPr>
+        </p:nvSpPr>
+        <p:spPr>
+          <a:xfrm>
+            <a:off x="1981200" y="1883390"/>
+            <a:ext cx="8305800" cy="4669809"/>
+          </a:xfrm>
+        </p:spPr>
+        <p:txBody>
+          <a:bodyPr>
+            <a:normAutofit/>
+          </a:bodyPr>
+          <a:lstStyle/>
+          <a:p>
+            <a:r>
+              <a:rPr lang="en-US" sz="3200" b="1" dirty="0">
+                <a:solidFill>
+                  <a:srgbClr val="FF0000"/>
+                </a:solidFill>
+              </a:rPr>
+              <a:t>Growing and prospering middle class, especially after WWII (1939-1945)</a:t>
+            </a:r>
+          </a:p>
+          <a:p>
+            <a:r>
+              <a:rPr lang="en-US" sz="3200" b="1" dirty="0">
+                <a:solidFill>
+                  <a:srgbClr val="FF0000"/>
+                </a:solidFill>
+              </a:rPr>
+              <a:t>More disposable income</a:t>
+            </a:r>
+          </a:p>
+          <a:p>
+            <a:r>
+              <a:rPr lang="en-US" sz="3200" b="1" dirty="0">
+                <a:solidFill>
+                  <a:srgbClr val="FF0000"/>
+                </a:solidFill>
+              </a:rPr>
+              <a:t>Spread of leisure, the near necessity to enjoy life</a:t>
+            </a:r>
+          </a:p>
+          <a:p>
+            <a:r>
+              <a:rPr lang="en-US" sz="3200" b="1" dirty="0">
+                <a:solidFill>
+                  <a:srgbClr val="FF0000"/>
+                </a:solidFill>
+              </a:rPr>
+              <a:t>Records became cheap and widely available.</a:t>
+            </a:r>
+          </a:p>
+          <a:p>
+            <a:r>
+              <a:rPr lang="en-US" sz="3200" b="1" dirty="0">
+                <a:solidFill>
+                  <a:srgbClr val="FF0000"/>
+                </a:solidFill>
+              </a:rPr>
+              <a:t>The city: noisy, light, busy, young</a:t>
+            </a:r>
+          </a:p>
+        </p:txBody>
+      </p:sp>
+      <p:sp>
+        <p:nvSpPr>
+          <p:cNvPr id="3" name="Title 2"/>
+          <p:cNvSpPr>
+            <a:spLocks noGrp="1"/>
+          </p:cNvSpPr>
+          <p:nvPr>
+            <p:ph type="title"/>
+          </p:nvPr>
+        </p:nvSpPr>
+        <p:spPr/>
+        <p:txBody>
+          <a:bodyPr>
+            <a:normAutofit/>
+          </a:bodyPr>
+          <a:lstStyle/>
+          <a:p>
+            <a:r>
+              <a:rPr lang="en-US" sz="7200" dirty="0"/>
+              <a:t>The audience</a:t>
+            </a:r>
+          </a:p>
+        </p:txBody>
+      </p:sp>
+    </p:spTree>
+    <p:extLst>
+      <p:ext uri="{BB962C8B-B14F-4D97-AF65-F5344CB8AC3E}">
+        <p14:creationId xmlns:p14="http://schemas.microsoft.com/office/powerpoint/2010/main" val="3027439901"/>
+      </p:ext>
+    </p:extLst>
+  </p:cSld>
+  <p:clrMapOvr>
+    <a:masterClrMapping/>
+  </p:clrMapOvr>
+</p:sld>
+</file>
+
+<file path=ppt/slides/slide12.xml><?xml version="1.0" encoding="utf-8"?>
+<p:sld xmlns:a="http://schemas.openxmlformats.org/drawingml/2006/main" xmlns:r="http://schemas.openxmlformats.org/officeDocument/2006/relationships" xmlns:p="http://schemas.openxmlformats.org/presentationml/2006/main">
+  <p:cSld>
+    <p:spTree>
+      <p:nvGrpSpPr>
+        <p:cNvPr id="1" name=""/>
+        <p:cNvGrpSpPr/>
+        <p:nvPr/>
+      </p:nvGrpSpPr>
+      <p:grpSpPr>
+        <a:xfrm>
+          <a:off x="0" y="0"/>
+          <a:ext cx="0" cy="0"/>
+          <a:chOff x="0" y="0"/>
+          <a:chExt cx="0" cy="0"/>
+        </a:xfrm>
+      </p:grpSpPr>
+      <p:sp>
+        <p:nvSpPr>
           <p:cNvPr id="2" name="Content Placeholder 1"/>
           <p:cNvSpPr>
             <a:spLocks noGrp="1"/>
@@ -3837,7 +4140,7 @@
 </p:sld>
 </file>
 
-<file path=ppt/slides/slide11.xml><?xml version="1.0" encoding="utf-8"?>
+<file path=ppt/slides/slide13.xml><?xml version="1.0" encoding="utf-8"?>
 <p:sld xmlns:a="http://schemas.openxmlformats.org/drawingml/2006/main" xmlns:r="http://schemas.openxmlformats.org/officeDocument/2006/relationships" xmlns:p="http://schemas.openxmlformats.org/presentationml/2006/main">
   <p:cSld>
     <p:spTree>
@@ -4085,7 +4388,7 @@
 </p:sld>
 </file>
 
-<file path=ppt/slides/slide12.xml><?xml version="1.0" encoding="utf-8"?>
+<file path=ppt/slides/slide14.xml><?xml version="1.0" encoding="utf-8"?>
 <p:sld xmlns:a="http://schemas.openxmlformats.org/drawingml/2006/main" xmlns:r="http://schemas.openxmlformats.org/officeDocument/2006/relationships" xmlns:p="http://schemas.openxmlformats.org/presentationml/2006/main">
   <p:cSld>
     <p:spTree>
@@ -4248,7 +4551,7 @@
 </p:sld>
 </file>
 
-<file path=ppt/slides/slide13.xml><?xml version="1.0" encoding="utf-8"?>
+<file path=ppt/slides/slide15.xml><?xml version="1.0" encoding="utf-8"?>
 <p:sld xmlns:a="http://schemas.openxmlformats.org/drawingml/2006/main" xmlns:r="http://schemas.openxmlformats.org/officeDocument/2006/relationships" xmlns:p="http://schemas.openxmlformats.org/presentationml/2006/main">
   <p:cSld>
     <p:spTree>
@@ -4414,7 +4717,138 @@
 </p:sld>
 </file>
 
-<file path=ppt/slides/slide14.xml><?xml version="1.0" encoding="utf-8"?>
+<file path=ppt/slides/slide16.xml><?xml version="1.0" encoding="utf-8"?>
+<p:sld xmlns:a="http://schemas.openxmlformats.org/drawingml/2006/main" xmlns:r="http://schemas.openxmlformats.org/officeDocument/2006/relationships" xmlns:p="http://schemas.openxmlformats.org/presentationml/2006/main">
+  <p:cSld>
+    <p:spTree>
+      <p:nvGrpSpPr>
+        <p:cNvPr id="1" name=""/>
+        <p:cNvGrpSpPr/>
+        <p:nvPr/>
+      </p:nvGrpSpPr>
+      <p:grpSpPr>
+        <a:xfrm>
+          <a:off x="0" y="0"/>
+          <a:ext cx="0" cy="0"/>
+          <a:chOff x="0" y="0"/>
+          <a:chExt cx="0" cy="0"/>
+        </a:xfrm>
+      </p:grpSpPr>
+      <p:sp>
+        <p:nvSpPr>
+          <p:cNvPr id="2" name="Title 1"/>
+          <p:cNvSpPr>
+            <a:spLocks noGrp="1"/>
+          </p:cNvSpPr>
+          <p:nvPr>
+            <p:ph type="title"/>
+          </p:nvPr>
+        </p:nvSpPr>
+        <p:spPr/>
+        <p:txBody>
+          <a:bodyPr>
+            <a:normAutofit/>
+          </a:bodyPr>
+          <a:lstStyle/>
+          <a:p>
+            <a:r>
+              <a:rPr lang="en-US" sz="5400" b="1" dirty="0">
+                <a:latin typeface="Aharoni" panose="02010803020104030203" pitchFamily="2" charset="-79"/>
+                <a:cs typeface="Aharoni" panose="02010803020104030203" pitchFamily="2" charset="-79"/>
+              </a:rPr>
+              <a:t>Chuck Berry</a:t>
+            </a:r>
+          </a:p>
+        </p:txBody>
+      </p:sp>
+      <p:sp>
+        <p:nvSpPr>
+          <p:cNvPr id="3" name="Content Placeholder 2"/>
+          <p:cNvSpPr>
+            <a:spLocks noGrp="1"/>
+          </p:cNvSpPr>
+          <p:nvPr>
+            <p:ph idx="1"/>
+          </p:nvPr>
+        </p:nvSpPr>
+        <p:spPr/>
+        <p:txBody>
+          <a:bodyPr/>
+          <a:lstStyle/>
+          <a:p>
+            <a:r>
+              <a:rPr lang="en-US" b="1" dirty="0"/>
+              <a:t>Charles Edward Anderson</a:t>
+            </a:r>
+            <a:r>
+              <a:rPr lang="en-US" dirty="0"/>
+              <a:t> "</a:t>
+            </a:r>
+            <a:r>
+              <a:rPr lang="en-US" b="1" dirty="0"/>
+              <a:t>Chuck</a:t>
+            </a:r>
+            <a:r>
+              <a:rPr lang="en-US" dirty="0"/>
+              <a:t>" </a:t>
+            </a:r>
+            <a:r>
+              <a:rPr lang="en-US" b="1" dirty="0"/>
+              <a:t>Berry</a:t>
+            </a:r>
+            <a:r>
+              <a:rPr lang="en-US" dirty="0"/>
+              <a:t> (born 1926, St. Louis)</a:t>
+            </a:r>
+          </a:p>
+          <a:p>
+            <a:r>
+              <a:rPr lang="en-US" dirty="0"/>
+              <a:t>Wild kid, prison, 1944-1947</a:t>
+            </a:r>
+          </a:p>
+          <a:p>
+            <a:r>
+              <a:rPr lang="en-US" dirty="0"/>
+              <a:t>Moved to Chicago, May 1955</a:t>
+            </a:r>
+          </a:p>
+          <a:p>
+            <a:r>
+              <a:rPr lang="en-US" dirty="0"/>
+              <a:t>Muddy Waters introduced him to the Chess brothers.</a:t>
+            </a:r>
+          </a:p>
+          <a:p>
+            <a:r>
+              <a:rPr lang="en-US" dirty="0"/>
+              <a:t>1955: “Ida Red,” became “</a:t>
+            </a:r>
+            <a:r>
+              <a:rPr lang="en-US" dirty="0" err="1"/>
+              <a:t>Maybellene</a:t>
+            </a:r>
+            <a:r>
+              <a:rPr lang="en-US" dirty="0"/>
+              <a:t>” [link]</a:t>
+            </a:r>
+          </a:p>
+        </p:txBody>
+      </p:sp>
+    </p:spTree>
+    <p:extLst>
+      <p:ext uri="{BB962C8B-B14F-4D97-AF65-F5344CB8AC3E}">
+        <p14:creationId xmlns:p14="http://schemas.microsoft.com/office/powerpoint/2010/main" val="27093596"/>
+      </p:ext>
+    </p:extLst>
+  </p:cSld>
+  <p:clrMapOvr>
+    <a:masterClrMapping/>
+  </p:clrMapOvr>
+</p:sld>
+</file>
+
+<file path=ppt/slides/slide17.xml><?xml version="1.0" encoding="utf-8"?>
 <p:sld xmlns:a="http://schemas.openxmlformats.org/drawingml/2006/main" xmlns:r="http://schemas.openxmlformats.org/officeDocument/2006/relationships" xmlns:p="http://schemas.openxmlformats.org/presentationml/2006/main">
   <p:cSld>
     <p:spTree>
@@ -4605,7 +5039,7 @@
 </p:sld>
 </file>
 
-<file path=ppt/slides/slide15.xml><?xml version="1.0" encoding="utf-8"?>
+<file path=ppt/slides/slide18.xml><?xml version="1.0" encoding="utf-8"?>
 <p:sld xmlns:a="http://schemas.openxmlformats.org/drawingml/2006/main" xmlns:r="http://schemas.openxmlformats.org/officeDocument/2006/relationships" xmlns:p="http://schemas.openxmlformats.org/presentationml/2006/main">
   <p:cSld>
     <p:spTree>
@@ -4624,137 +5058,6 @@
       </p:grpSpPr>
       <p:sp>
         <p:nvSpPr>
-          <p:cNvPr id="2" name="Title 1"/>
-          <p:cNvSpPr>
-            <a:spLocks noGrp="1"/>
-          </p:cNvSpPr>
-          <p:nvPr>
-            <p:ph type="title"/>
-          </p:nvPr>
-        </p:nvSpPr>
-        <p:spPr/>
-        <p:txBody>
-          <a:bodyPr>
-            <a:normAutofit/>
-          </a:bodyPr>
-          <a:lstStyle/>
-          <a:p>
-            <a:r>
-              <a:rPr lang="en-US" sz="5400" b="1" dirty="0">
-                <a:latin typeface="Aharoni" panose="02010803020104030203" pitchFamily="2" charset="-79"/>
-                <a:cs typeface="Aharoni" panose="02010803020104030203" pitchFamily="2" charset="-79"/>
-              </a:rPr>
-              <a:t>Chuck Berry</a:t>
-            </a:r>
-          </a:p>
-        </p:txBody>
-      </p:sp>
-      <p:sp>
-        <p:nvSpPr>
-          <p:cNvPr id="3" name="Content Placeholder 2"/>
-          <p:cNvSpPr>
-            <a:spLocks noGrp="1"/>
-          </p:cNvSpPr>
-          <p:nvPr>
-            <p:ph idx="1"/>
-          </p:nvPr>
-        </p:nvSpPr>
-        <p:spPr/>
-        <p:txBody>
-          <a:bodyPr/>
-          <a:lstStyle/>
-          <a:p>
-            <a:r>
-              <a:rPr lang="en-US" b="1" dirty="0"/>
-              <a:t>Charles Edward Anderson</a:t>
-            </a:r>
-            <a:r>
-              <a:rPr lang="en-US" dirty="0"/>
-              <a:t> "</a:t>
-            </a:r>
-            <a:r>
-              <a:rPr lang="en-US" b="1" dirty="0"/>
-              <a:t>Chuck</a:t>
-            </a:r>
-            <a:r>
-              <a:rPr lang="en-US" dirty="0"/>
-              <a:t>" </a:t>
-            </a:r>
-            <a:r>
-              <a:rPr lang="en-US" b="1" dirty="0"/>
-              <a:t>Berry</a:t>
-            </a:r>
-            <a:r>
-              <a:rPr lang="en-US" dirty="0"/>
-              <a:t> (born 1926, St. Louis)</a:t>
-            </a:r>
-          </a:p>
-          <a:p>
-            <a:r>
-              <a:rPr lang="en-US" dirty="0"/>
-              <a:t>Wild kid, prison, 1944-1947</a:t>
-            </a:r>
-          </a:p>
-          <a:p>
-            <a:r>
-              <a:rPr lang="en-US" dirty="0"/>
-              <a:t>Moved to Chicago, May 1955</a:t>
-            </a:r>
-          </a:p>
-          <a:p>
-            <a:r>
-              <a:rPr lang="en-US" dirty="0"/>
-              <a:t>Muddy Waters introduced him to the Chess brothers.</a:t>
-            </a:r>
-          </a:p>
-          <a:p>
-            <a:r>
-              <a:rPr lang="en-US" dirty="0"/>
-              <a:t>1955: “Ida Red,” became “</a:t>
-            </a:r>
-            <a:r>
-              <a:rPr lang="en-US" dirty="0" err="1"/>
-              <a:t>Maybellene</a:t>
-            </a:r>
-            <a:r>
-              <a:rPr lang="en-US" dirty="0"/>
-              <a:t>” [link]</a:t>
-            </a:r>
-          </a:p>
-        </p:txBody>
-      </p:sp>
-    </p:spTree>
-    <p:extLst>
-      <p:ext uri="{BB962C8B-B14F-4D97-AF65-F5344CB8AC3E}">
-        <p14:creationId xmlns:p14="http://schemas.microsoft.com/office/powerpoint/2010/main" val="27093596"/>
-      </p:ext>
-    </p:extLst>
-  </p:cSld>
-  <p:clrMapOvr>
-    <a:masterClrMapping/>
-  </p:clrMapOvr>
-</p:sld>
-</file>
-
-<file path=ppt/slides/slide16.xml><?xml version="1.0" encoding="utf-8"?>
-<p:sld xmlns:a="http://schemas.openxmlformats.org/drawingml/2006/main" xmlns:r="http://schemas.openxmlformats.org/officeDocument/2006/relationships" xmlns:p="http://schemas.openxmlformats.org/presentationml/2006/main">
-  <p:cSld>
-    <p:spTree>
-      <p:nvGrpSpPr>
-        <p:cNvPr id="1" name=""/>
-        <p:cNvGrpSpPr/>
-        <p:nvPr/>
-      </p:nvGrpSpPr>
-      <p:grpSpPr>
-        <a:xfrm>
-          <a:off x="0" y="0"/>
-          <a:ext cx="0" cy="0"/>
-          <a:chOff x="0" y="0"/>
-          <a:chExt cx="0" cy="0"/>
-        </a:xfrm>
-      </p:grpSpPr>
-      <p:sp>
-        <p:nvSpPr>
           <p:cNvPr id="2" name="Content Placeholder 1"/>
           <p:cNvSpPr>
             <a:spLocks noGrp="1"/>
@@ -4777,8 +5080,13 @@
           <a:p>
             <a:r>
               <a:rPr lang="en-US" dirty="0"/>
-              <a:t>First important Rock “Disc Jockey” DJ</a:t>
-            </a:r>
+              <a:t>First important Rock “Disc Jockey</a:t>
+            </a:r>
+            <a:r>
+              <a:rPr lang="en-US"/>
+              <a:t>” (DJ)</a:t>
+            </a:r>
+            <a:endParaRPr lang="en-US" dirty="0"/>
           </a:p>
           <a:p>
             <a:r>
@@ -4950,7 +5258,7 @@
 </p:sld>
 </file>
 
-<file path=ppt/slides/slide17.xml><?xml version="1.0" encoding="utf-8"?>
+<file path=ppt/slides/slide19.xml><?xml version="1.0" encoding="utf-8"?>
 <p:sld xmlns:a="http://schemas.openxmlformats.org/drawingml/2006/main" xmlns:r="http://schemas.openxmlformats.org/officeDocument/2006/relationships" xmlns:p="http://schemas.openxmlformats.org/presentationml/2006/main">
   <p:cSld>
     <p:spTree>
@@ -5054,103 +5362,6 @@
     <p:extLst>
       <p:ext uri="{BB962C8B-B14F-4D97-AF65-F5344CB8AC3E}">
         <p14:creationId xmlns:p14="http://schemas.microsoft.com/office/powerpoint/2010/main" val="1739031549"/>
-      </p:ext>
-    </p:extLst>
-  </p:cSld>
-  <p:clrMapOvr>
-    <a:masterClrMapping/>
-  </p:clrMapOvr>
-</p:sld>
-</file>
-
-<file path=ppt/slides/slide18.xml><?xml version="1.0" encoding="utf-8"?>
-<p:sld xmlns:a="http://schemas.openxmlformats.org/drawingml/2006/main" xmlns:r="http://schemas.openxmlformats.org/officeDocument/2006/relationships" xmlns:p="http://schemas.openxmlformats.org/presentationml/2006/main">
-  <p:cSld>
-    <p:spTree>
-      <p:nvGrpSpPr>
-        <p:cNvPr id="1" name=""/>
-        <p:cNvGrpSpPr/>
-        <p:nvPr/>
-      </p:nvGrpSpPr>
-      <p:grpSpPr>
-        <a:xfrm>
-          <a:off x="0" y="0"/>
-          <a:ext cx="0" cy="0"/>
-          <a:chOff x="0" y="0"/>
-          <a:chExt cx="0" cy="0"/>
-        </a:xfrm>
-      </p:grpSpPr>
-      <p:sp>
-        <p:nvSpPr>
-          <p:cNvPr id="2" name="Title 1"/>
-          <p:cNvSpPr>
-            <a:spLocks noGrp="1"/>
-          </p:cNvSpPr>
-          <p:nvPr>
-            <p:ph type="title"/>
-          </p:nvPr>
-        </p:nvSpPr>
-        <p:spPr>
-          <a:xfrm>
-            <a:off x="838200" y="1"/>
-            <a:ext cx="10515600" cy="627796"/>
-          </a:xfrm>
-        </p:spPr>
-        <p:txBody>
-          <a:bodyPr>
-            <a:normAutofit fontScale="90000"/>
-          </a:bodyPr>
-          <a:lstStyle/>
-          <a:p>
-            <a:pPr algn="ctr"/>
-            <a:r>
-              <a:rPr lang="en-US" b="1" dirty="0"/>
-              <a:t>Chuck Berry shared the royalties: </a:t>
-            </a:r>
-            <a:r>
-              <a:rPr lang="en-US" b="1" dirty="0" err="1"/>
-              <a:t>Maybellene</a:t>
-            </a:r>
-            <a:r>
-              <a:rPr lang="en-US" b="1" dirty="0"/>
-              <a:t>, 1955</a:t>
-            </a:r>
-          </a:p>
-        </p:txBody>
-      </p:sp>
-      <p:pic>
-        <p:nvPicPr>
-          <p:cNvPr id="4" name="Content Placeholder 3"/>
-          <p:cNvPicPr>
-            <a:picLocks noGrp="1" noChangeAspect="1"/>
-          </p:cNvPicPr>
-          <p:nvPr>
-            <p:ph idx="1"/>
-          </p:nvPr>
-        </p:nvPicPr>
-        <p:blipFill>
-          <a:blip r:embed="rId2">
-            <a:extLst>
-              <a:ext uri="{28A0092B-C50C-407E-A947-70E740481C1C}">
-                <a14:useLocalDpi xmlns:a14="http://schemas.microsoft.com/office/drawing/2010/main" val="0"/>
-              </a:ext>
-            </a:extLst>
-          </a:blip>
-          <a:stretch>
-            <a:fillRect/>
-          </a:stretch>
-        </p:blipFill>
-        <p:spPr>
-          <a:xfrm>
-            <a:off x="3066197" y="681057"/>
-            <a:ext cx="6059606" cy="6083003"/>
-          </a:xfrm>
-        </p:spPr>
-      </p:pic>
-    </p:spTree>
-    <p:extLst>
-      <p:ext uri="{BB962C8B-B14F-4D97-AF65-F5344CB8AC3E}">
-        <p14:creationId xmlns:p14="http://schemas.microsoft.com/office/powerpoint/2010/main" val="2913697665"/>
       </p:ext>
     </p:extLst>
   </p:cSld>
@@ -5189,13 +5400,13 @@
         </p:nvSpPr>
         <p:spPr>
           <a:xfrm>
-            <a:off x="725864" y="1536569"/>
-            <a:ext cx="10627936" cy="4640394"/>
+            <a:off x="725864" y="1385740"/>
+            <a:ext cx="10991654" cy="5261254"/>
           </a:xfrm>
         </p:spPr>
         <p:txBody>
           <a:bodyPr>
-            <a:normAutofit fontScale="92500" lnSpcReduction="10000"/>
+            <a:normAutofit lnSpcReduction="10000"/>
           </a:bodyPr>
           <a:lstStyle/>
           <a:p>
@@ -5225,51 +5436,7 @@
           <a:p>
             <a:r>
               <a:rPr lang="en-US" dirty="0"/>
-              <a:t>1938: Sister Rosetta Tharpe recorded “Rock Me” for Decca Records.</a:t>
-            </a:r>
-          </a:p>
-          <a:p>
-            <a:r>
-              <a:rPr lang="en-US" dirty="0"/>
-              <a:t>Her music tried to cross-over from gospel to rhythm and blues.</a:t>
-            </a:r>
-          </a:p>
-          <a:p>
-            <a:r>
-              <a:rPr lang="en-US" dirty="0" err="1"/>
-              <a:t>Tharpe</a:t>
-            </a:r>
-            <a:r>
-              <a:rPr lang="en-US" dirty="0"/>
-              <a:t> had a huge influence on Little Richard, Chuck Berry, Johnny Cash, and Elvis Presley.</a:t>
-            </a:r>
-          </a:p>
-          <a:p>
-            <a:r>
-              <a:rPr lang="en-US" dirty="0"/>
-              <a:t>1942: Maurie </a:t>
-            </a:r>
-            <a:r>
-              <a:rPr lang="en-US" dirty="0" err="1"/>
-              <a:t>Orodeneker</a:t>
-            </a:r>
-            <a:r>
-              <a:rPr lang="en-US" dirty="0"/>
-              <a:t> began to call more upbeat recordings such as Tharpe's "Rock Me“ as rock and roll: "It's Sister Rosetta Tharpe for the rock-and-roll spiritual singing.”</a:t>
-            </a:r>
-          </a:p>
-          <a:p>
-            <a:r>
-              <a:rPr lang="en-US" dirty="0"/>
-              <a:t>1949: </a:t>
-            </a:r>
-            <a:r>
-              <a:rPr lang="en-US" dirty="0" err="1"/>
-              <a:t>Goree</a:t>
-            </a:r>
-            <a:r>
-              <a:rPr lang="en-US" dirty="0"/>
-              <a:t> Carter, “Rock Awhile” [</a:t>
+              <a:t>1938: Sister Rosetta Tharpe recorded “Rock Me” for Decca Records [</a:t>
             </a:r>
             <a:r>
               <a:rPr lang="en-US" dirty="0">
@@ -5279,7 +5446,79 @@
             </a:r>
             <a:r>
               <a:rPr lang="en-US" dirty="0"/>
+              <a:t>].</a:t>
+            </a:r>
+          </a:p>
+          <a:p>
+            <a:pPr lvl="1"/>
+            <a:r>
+              <a:rPr lang="en-US" dirty="0"/>
+              <a:t>Her music tried to cross-over from gospel to rhythm and blues.</a:t>
+            </a:r>
+          </a:p>
+          <a:p>
+            <a:pPr lvl="1"/>
+            <a:r>
+              <a:rPr lang="en-US" dirty="0" err="1"/>
+              <a:t>Tharpe</a:t>
+            </a:r>
+            <a:r>
+              <a:rPr lang="en-US" dirty="0"/>
+              <a:t> had a huge influence on Little Richard, Chuck Berry, Johnny Cash, and Elvis Presley.</a:t>
+            </a:r>
+          </a:p>
+          <a:p>
+            <a:r>
+              <a:rPr lang="en-US" dirty="0"/>
+              <a:t>1942: Maurie </a:t>
+            </a:r>
+            <a:r>
+              <a:rPr lang="en-US" dirty="0" err="1"/>
+              <a:t>Orodeneker</a:t>
+            </a:r>
+            <a:r>
+              <a:rPr lang="en-US" dirty="0"/>
+              <a:t> began to call more upbeat recordings such as Tharpe's "Rock Me“ as rock and roll: "It's Sister Rosetta Tharpe for the rock-and-roll spiritual singing.”</a:t>
+            </a:r>
+          </a:p>
+          <a:p>
+            <a:r>
+              <a:rPr lang="en-US" dirty="0"/>
+              <a:t>1949: </a:t>
+            </a:r>
+            <a:r>
+              <a:rPr lang="en-US" dirty="0" err="1"/>
+              <a:t>Goree</a:t>
+            </a:r>
+            <a:r>
+              <a:rPr lang="en-US" dirty="0"/>
+              <a:t> Carter, “Rock Awhile” [</a:t>
+            </a:r>
+            <a:r>
+              <a:rPr lang="en-US" dirty="0">
+                <a:hlinkClick r:id="rId5"/>
+              </a:rPr>
+              <a:t>link</a:t>
+            </a:r>
+            <a:r>
+              <a:rPr lang="en-US" dirty="0"/>
               <a:t>] (Robert Palmer, the first Rock and Roll song).</a:t>
+            </a:r>
+          </a:p>
+          <a:p>
+            <a:r>
+              <a:rPr lang="en-US" dirty="0"/>
+              <a:t>1950: Muddy Waters, “Rollin’ Stone” [</a:t>
+            </a:r>
+            <a:r>
+              <a:rPr lang="en-US" dirty="0">
+                <a:hlinkClick r:id="rId6"/>
+              </a:rPr>
+              <a:t>link</a:t>
+            </a:r>
+            <a:r>
+              <a:rPr lang="en-US" dirty="0"/>
+              <a:t>] (first recorded by Chess Records).</a:t>
             </a:r>
           </a:p>
           <a:p>
@@ -5323,6 +5562,103 @@
     <p:extLst>
       <p:ext uri="{BB962C8B-B14F-4D97-AF65-F5344CB8AC3E}">
         <p14:creationId xmlns:p14="http://schemas.microsoft.com/office/powerpoint/2010/main" val="2626437058"/>
+      </p:ext>
+    </p:extLst>
+  </p:cSld>
+  <p:clrMapOvr>
+    <a:masterClrMapping/>
+  </p:clrMapOvr>
+</p:sld>
+</file>
+
+<file path=ppt/slides/slide20.xml><?xml version="1.0" encoding="utf-8"?>
+<p:sld xmlns:a="http://schemas.openxmlformats.org/drawingml/2006/main" xmlns:r="http://schemas.openxmlformats.org/officeDocument/2006/relationships" xmlns:p="http://schemas.openxmlformats.org/presentationml/2006/main">
+  <p:cSld>
+    <p:spTree>
+      <p:nvGrpSpPr>
+        <p:cNvPr id="1" name=""/>
+        <p:cNvGrpSpPr/>
+        <p:nvPr/>
+      </p:nvGrpSpPr>
+      <p:grpSpPr>
+        <a:xfrm>
+          <a:off x="0" y="0"/>
+          <a:ext cx="0" cy="0"/>
+          <a:chOff x="0" y="0"/>
+          <a:chExt cx="0" cy="0"/>
+        </a:xfrm>
+      </p:grpSpPr>
+      <p:sp>
+        <p:nvSpPr>
+          <p:cNvPr id="2" name="Title 1"/>
+          <p:cNvSpPr>
+            <a:spLocks noGrp="1"/>
+          </p:cNvSpPr>
+          <p:nvPr>
+            <p:ph type="title"/>
+          </p:nvPr>
+        </p:nvSpPr>
+        <p:spPr>
+          <a:xfrm>
+            <a:off x="838200" y="1"/>
+            <a:ext cx="10515600" cy="627796"/>
+          </a:xfrm>
+        </p:spPr>
+        <p:txBody>
+          <a:bodyPr>
+            <a:normAutofit fontScale="90000"/>
+          </a:bodyPr>
+          <a:lstStyle/>
+          <a:p>
+            <a:pPr algn="ctr"/>
+            <a:r>
+              <a:rPr lang="en-US" b="1" dirty="0"/>
+              <a:t>Chuck Berry shared the royalties: </a:t>
+            </a:r>
+            <a:r>
+              <a:rPr lang="en-US" b="1" dirty="0" err="1"/>
+              <a:t>Maybellene</a:t>
+            </a:r>
+            <a:r>
+              <a:rPr lang="en-US" b="1" dirty="0"/>
+              <a:t>, 1955</a:t>
+            </a:r>
+          </a:p>
+        </p:txBody>
+      </p:sp>
+      <p:pic>
+        <p:nvPicPr>
+          <p:cNvPr id="4" name="Content Placeholder 3"/>
+          <p:cNvPicPr>
+            <a:picLocks noGrp="1" noChangeAspect="1"/>
+          </p:cNvPicPr>
+          <p:nvPr>
+            <p:ph idx="1"/>
+          </p:nvPr>
+        </p:nvPicPr>
+        <p:blipFill>
+          <a:blip r:embed="rId2">
+            <a:extLst>
+              <a:ext uri="{28A0092B-C50C-407E-A947-70E740481C1C}">
+                <a14:useLocalDpi xmlns:a14="http://schemas.microsoft.com/office/drawing/2010/main" val="0"/>
+              </a:ext>
+            </a:extLst>
+          </a:blip>
+          <a:stretch>
+            <a:fillRect/>
+          </a:stretch>
+        </p:blipFill>
+        <p:spPr>
+          <a:xfrm>
+            <a:off x="3066197" y="681057"/>
+            <a:ext cx="6059606" cy="6083003"/>
+          </a:xfrm>
+        </p:spPr>
+      </p:pic>
+    </p:spTree>
+    <p:extLst>
+      <p:ext uri="{BB962C8B-B14F-4D97-AF65-F5344CB8AC3E}">
+        <p14:creationId xmlns:p14="http://schemas.microsoft.com/office/powerpoint/2010/main" val="2913697665"/>
       </p:ext>
     </p:extLst>
   </p:cSld>
@@ -6095,6 +6431,242 @@
       </p:grpSpPr>
       <p:sp>
         <p:nvSpPr>
+          <p:cNvPr id="2" name="Title 1">
+            <a:extLst>
+              <a:ext uri="{FF2B5EF4-FFF2-40B4-BE49-F238E27FC236}">
+                <a16:creationId xmlns:a16="http://schemas.microsoft.com/office/drawing/2014/main" id="{6172C187-9475-4D2B-8706-2E816A48486C}"/>
+              </a:ext>
+            </a:extLst>
+          </p:cNvPr>
+          <p:cNvSpPr>
+            <a:spLocks noGrp="1"/>
+          </p:cNvSpPr>
+          <p:nvPr>
+            <p:ph type="title"/>
+          </p:nvPr>
+        </p:nvSpPr>
+        <p:spPr>
+          <a:xfrm>
+            <a:off x="322082" y="223723"/>
+            <a:ext cx="11547835" cy="1293993"/>
+          </a:xfrm>
+        </p:spPr>
+        <p:txBody>
+          <a:bodyPr>
+            <a:normAutofit fontScale="90000"/>
+          </a:bodyPr>
+          <a:lstStyle/>
+          <a:p>
+            <a:r>
+              <a:rPr lang="en-CA" b="1" dirty="0"/>
+              <a:t>Great Migration, African-Americans migrate to the north, 1916-1970</a:t>
+            </a:r>
+          </a:p>
+        </p:txBody>
+      </p:sp>
+      <p:sp>
+        <p:nvSpPr>
+          <p:cNvPr id="3" name="Content Placeholder 2">
+            <a:extLst>
+              <a:ext uri="{FF2B5EF4-FFF2-40B4-BE49-F238E27FC236}">
+                <a16:creationId xmlns:a16="http://schemas.microsoft.com/office/drawing/2014/main" id="{7EBE381C-FEBA-48FE-B2E4-DBDF1ED7FC0C}"/>
+              </a:ext>
+            </a:extLst>
+          </p:cNvPr>
+          <p:cNvSpPr>
+            <a:spLocks noGrp="1"/>
+          </p:cNvSpPr>
+          <p:nvPr>
+            <p:ph sz="half" idx="1"/>
+          </p:nvPr>
+        </p:nvSpPr>
+        <p:spPr/>
+        <p:txBody>
+          <a:bodyPr/>
+          <a:lstStyle/>
+          <a:p>
+            <a:r>
+              <a:rPr lang="en-CA" dirty="0"/>
+              <a:t>Six million migrated to northeast, Midwest, and California</a:t>
+            </a:r>
+          </a:p>
+          <a:p>
+            <a:r>
+              <a:rPr lang="en-CA" dirty="0"/>
+              <a:t>Started during WWI, but accelerated after the Great Mississippi Flood of 1927</a:t>
+            </a:r>
+          </a:p>
+          <a:p>
+            <a:r>
+              <a:rPr lang="en-CA" dirty="0"/>
+              <a:t>Memphis Minnie (and Kansas Joe), “When the Levee Breaks,” 1929 [link]</a:t>
+            </a:r>
+          </a:p>
+          <a:p>
+            <a:r>
+              <a:rPr lang="en-CA" dirty="0"/>
+              <a:t>Accelerated again after WWII</a:t>
+            </a:r>
+          </a:p>
+        </p:txBody>
+      </p:sp>
+      <p:sp>
+        <p:nvSpPr>
+          <p:cNvPr id="4" name="Content Placeholder 3">
+            <a:extLst>
+              <a:ext uri="{FF2B5EF4-FFF2-40B4-BE49-F238E27FC236}">
+                <a16:creationId xmlns:a16="http://schemas.microsoft.com/office/drawing/2014/main" id="{96257644-D499-422A-A0DC-1AF557CCCB7A}"/>
+              </a:ext>
+            </a:extLst>
+          </p:cNvPr>
+          <p:cNvSpPr>
+            <a:spLocks noGrp="1"/>
+          </p:cNvSpPr>
+          <p:nvPr>
+            <p:ph sz="half" idx="2"/>
+          </p:nvPr>
+        </p:nvSpPr>
+        <p:spPr/>
+        <p:txBody>
+          <a:bodyPr/>
+          <a:lstStyle/>
+          <a:p>
+            <a:r>
+              <a:rPr lang="en-CA" dirty="0"/>
+              <a:t>630,000 people affected by the flood in Mississippi, Louisiana, and Arkansas.</a:t>
+            </a:r>
+          </a:p>
+          <a:p>
+            <a:r>
+              <a:rPr lang="en-CA" dirty="0"/>
+              <a:t>200,000 African-Americans lost their homes, lived in relief camps.</a:t>
+            </a:r>
+          </a:p>
+          <a:p>
+            <a:r>
+              <a:rPr lang="en-CA" dirty="0"/>
+              <a:t>Nothing to go home to, so…</a:t>
+            </a:r>
+          </a:p>
+          <a:p>
+            <a:r>
+              <a:rPr lang="en-CA" dirty="0"/>
+              <a:t>Chicago, New York, Boston</a:t>
+            </a:r>
+          </a:p>
+          <a:p>
+            <a:r>
+              <a:rPr lang="en-CA" dirty="0"/>
+              <a:t>By 1970, </a:t>
+            </a:r>
+          </a:p>
+        </p:txBody>
+      </p:sp>
+    </p:spTree>
+    <p:extLst>
+      <p:ext uri="{BB962C8B-B14F-4D97-AF65-F5344CB8AC3E}">
+        <p14:creationId xmlns:p14="http://schemas.microsoft.com/office/powerpoint/2010/main" val="373885247"/>
+      </p:ext>
+    </p:extLst>
+  </p:cSld>
+  <p:clrMapOvr>
+    <a:masterClrMapping/>
+  </p:clrMapOvr>
+</p:sld>
+</file>
+
+<file path=ppt/slides/slide8.xml><?xml version="1.0" encoding="utf-8"?>
+<p:sld xmlns:a="http://schemas.openxmlformats.org/drawingml/2006/main" xmlns:r="http://schemas.openxmlformats.org/officeDocument/2006/relationships" xmlns:p="http://schemas.openxmlformats.org/presentationml/2006/main">
+  <p:cSld>
+    <p:bg>
+      <p:bgPr>
+        <a:solidFill>
+          <a:schemeClr val="bg1"/>
+        </a:solidFill>
+        <a:effectLst/>
+      </p:bgPr>
+    </p:bg>
+    <p:spTree>
+      <p:nvGrpSpPr>
+        <p:cNvPr id="1" name=""/>
+        <p:cNvGrpSpPr/>
+        <p:nvPr/>
+      </p:nvGrpSpPr>
+      <p:grpSpPr>
+        <a:xfrm>
+          <a:off x="0" y="0"/>
+          <a:ext cx="0" cy="0"/>
+          <a:chOff x="0" y="0"/>
+          <a:chExt cx="0" cy="0"/>
+        </a:xfrm>
+      </p:grpSpPr>
+      <p:pic>
+        <p:nvPicPr>
+          <p:cNvPr id="3" name="Picture 2">
+            <a:extLst>
+              <a:ext uri="{FF2B5EF4-FFF2-40B4-BE49-F238E27FC236}">
+                <a16:creationId xmlns:a16="http://schemas.microsoft.com/office/drawing/2014/main" id="{F298A2BA-0A23-4CEF-8725-5C6CD9937E45}"/>
+              </a:ext>
+            </a:extLst>
+          </p:cNvPr>
+          <p:cNvPicPr>
+            <a:picLocks noChangeAspect="1"/>
+          </p:cNvPicPr>
+          <p:nvPr/>
+        </p:nvPicPr>
+        <p:blipFill rotWithShape="1">
+          <a:blip r:embed="rId3">
+            <a:extLst>
+              <a:ext uri="{28A0092B-C50C-407E-A947-70E740481C1C}">
+                <a14:useLocalDpi xmlns:a14="http://schemas.microsoft.com/office/drawing/2010/main" val="0"/>
+              </a:ext>
+            </a:extLst>
+          </a:blip>
+          <a:srcRect t="2688" b="25427"/>
+          <a:stretch/>
+        </p:blipFill>
+        <p:spPr>
+          <a:xfrm>
+            <a:off x="20" y="10"/>
+            <a:ext cx="12191980" cy="6857990"/>
+          </a:xfrm>
+          <a:prstGeom prst="rect">
+            <a:avLst/>
+          </a:prstGeom>
+        </p:spPr>
+      </p:pic>
+    </p:spTree>
+    <p:extLst>
+      <p:ext uri="{BB962C8B-B14F-4D97-AF65-F5344CB8AC3E}">
+        <p14:creationId xmlns:p14="http://schemas.microsoft.com/office/powerpoint/2010/main" val="2984874458"/>
+      </p:ext>
+    </p:extLst>
+  </p:cSld>
+  <p:clrMapOvr>
+    <a:masterClrMapping/>
+  </p:clrMapOvr>
+</p:sld>
+</file>
+
+<file path=ppt/slides/slide9.xml><?xml version="1.0" encoding="utf-8"?>
+<p:sld xmlns:a="http://schemas.openxmlformats.org/drawingml/2006/main" xmlns:r="http://schemas.openxmlformats.org/officeDocument/2006/relationships" xmlns:p="http://schemas.openxmlformats.org/presentationml/2006/main">
+  <p:cSld>
+    <p:spTree>
+      <p:nvGrpSpPr>
+        <p:cNvPr id="1" name=""/>
+        <p:cNvGrpSpPr/>
+        <p:nvPr/>
+      </p:nvGrpSpPr>
+      <p:grpSpPr>
+        <a:xfrm>
+          <a:off x="0" y="0"/>
+          <a:ext cx="0" cy="0"/>
+          <a:chOff x="0" y="0"/>
+          <a:chExt cx="0" cy="0"/>
+        </a:xfrm>
+      </p:grpSpPr>
+      <p:sp>
+        <p:nvSpPr>
           <p:cNvPr id="2" name="Title 1"/>
           <p:cNvSpPr>
             <a:spLocks noGrp="1"/>
@@ -6207,220 +6779,6 @@
     <p:extLst>
       <p:ext uri="{BB962C8B-B14F-4D97-AF65-F5344CB8AC3E}">
         <p14:creationId xmlns:p14="http://schemas.microsoft.com/office/powerpoint/2010/main" val="3751597966"/>
-      </p:ext>
-    </p:extLst>
-  </p:cSld>
-  <p:clrMapOvr>
-    <a:masterClrMapping/>
-  </p:clrMapOvr>
-</p:sld>
-</file>
-
-<file path=ppt/slides/slide8.xml><?xml version="1.0" encoding="utf-8"?>
-<p:sld xmlns:a="http://schemas.openxmlformats.org/drawingml/2006/main" xmlns:r="http://schemas.openxmlformats.org/officeDocument/2006/relationships" xmlns:p="http://schemas.openxmlformats.org/presentationml/2006/main">
-  <p:cSld>
-    <p:spTree>
-      <p:nvGrpSpPr>
-        <p:cNvPr id="1" name=""/>
-        <p:cNvGrpSpPr/>
-        <p:nvPr/>
-      </p:nvGrpSpPr>
-      <p:grpSpPr>
-        <a:xfrm>
-          <a:off x="0" y="0"/>
-          <a:ext cx="0" cy="0"/>
-          <a:chOff x="0" y="0"/>
-          <a:chExt cx="0" cy="0"/>
-        </a:xfrm>
-      </p:grpSpPr>
-      <p:sp>
-        <p:nvSpPr>
-          <p:cNvPr id="2" name="Title 1"/>
-          <p:cNvSpPr>
-            <a:spLocks noGrp="1"/>
-          </p:cNvSpPr>
-          <p:nvPr>
-            <p:ph type="title"/>
-          </p:nvPr>
-        </p:nvSpPr>
-        <p:spPr>
-          <a:xfrm>
-            <a:off x="810904" y="1"/>
-            <a:ext cx="10515600" cy="928048"/>
-          </a:xfrm>
-        </p:spPr>
-        <p:txBody>
-          <a:bodyPr/>
-          <a:lstStyle/>
-          <a:p>
-            <a:pPr algn="ctr"/>
-            <a:r>
-              <a:rPr lang="en-US" b="1" dirty="0"/>
-              <a:t>Post World War II Baby Boom, the last</a:t>
-            </a:r>
-          </a:p>
-        </p:txBody>
-      </p:sp>
-      <p:pic>
-        <p:nvPicPr>
-          <p:cNvPr id="4" name="Content Placeholder 3"/>
-          <p:cNvPicPr>
-            <a:picLocks noGrp="1" noChangeAspect="1"/>
-          </p:cNvPicPr>
-          <p:nvPr>
-            <p:ph idx="1"/>
-          </p:nvPr>
-        </p:nvPicPr>
-        <p:blipFill>
-          <a:blip r:embed="rId3">
-            <a:extLst>
-              <a:ext uri="{28A0092B-C50C-407E-A947-70E740481C1C}">
-                <a14:useLocalDpi xmlns:a14="http://schemas.microsoft.com/office/drawing/2010/main" val="0"/>
-              </a:ext>
-            </a:extLst>
-          </a:blip>
-          <a:stretch>
-            <a:fillRect/>
-          </a:stretch>
-        </p:blipFill>
-        <p:spPr>
-          <a:xfrm>
-            <a:off x="889948" y="828811"/>
-            <a:ext cx="10412104" cy="6029189"/>
-          </a:xfrm>
-        </p:spPr>
-      </p:pic>
-    </p:spTree>
-    <p:extLst>
-      <p:ext uri="{BB962C8B-B14F-4D97-AF65-F5344CB8AC3E}">
-        <p14:creationId xmlns:p14="http://schemas.microsoft.com/office/powerpoint/2010/main" val="2228129065"/>
-      </p:ext>
-    </p:extLst>
-  </p:cSld>
-  <p:clrMapOvr>
-    <a:masterClrMapping/>
-  </p:clrMapOvr>
-</p:sld>
-</file>
-
-<file path=ppt/slides/slide9.xml><?xml version="1.0" encoding="utf-8"?>
-<p:sld xmlns:a="http://schemas.openxmlformats.org/drawingml/2006/main" xmlns:r="http://schemas.openxmlformats.org/officeDocument/2006/relationships" xmlns:p="http://schemas.openxmlformats.org/presentationml/2006/main">
-  <p:cSld>
-    <p:spTree>
-      <p:nvGrpSpPr>
-        <p:cNvPr id="1" name=""/>
-        <p:cNvGrpSpPr/>
-        <p:nvPr/>
-      </p:nvGrpSpPr>
-      <p:grpSpPr>
-        <a:xfrm>
-          <a:off x="0" y="0"/>
-          <a:ext cx="0" cy="0"/>
-          <a:chOff x="0" y="0"/>
-          <a:chExt cx="0" cy="0"/>
-        </a:xfrm>
-      </p:grpSpPr>
-      <p:sp>
-        <p:nvSpPr>
-          <p:cNvPr id="2" name="Content Placeholder 1"/>
-          <p:cNvSpPr>
-            <a:spLocks noGrp="1"/>
-          </p:cNvSpPr>
-          <p:nvPr>
-            <p:ph idx="1"/>
-          </p:nvPr>
-        </p:nvSpPr>
-        <p:spPr>
-          <a:xfrm>
-            <a:off x="1981200" y="1883390"/>
-            <a:ext cx="8305800" cy="4669809"/>
-          </a:xfrm>
-        </p:spPr>
-        <p:txBody>
-          <a:bodyPr>
-            <a:normAutofit/>
-          </a:bodyPr>
-          <a:lstStyle/>
-          <a:p>
-            <a:r>
-              <a:rPr lang="en-US" sz="3200" b="1" dirty="0">
-                <a:solidFill>
-                  <a:srgbClr val="FF0000"/>
-                </a:solidFill>
-              </a:rPr>
-              <a:t>Growing and prospering middle class, especially after WWII (1939-1945)</a:t>
-            </a:r>
-          </a:p>
-          <a:p>
-            <a:r>
-              <a:rPr lang="en-US" sz="3200" b="1" dirty="0">
-                <a:solidFill>
-                  <a:srgbClr val="FF0000"/>
-                </a:solidFill>
-              </a:rPr>
-              <a:t>More disposable income</a:t>
-            </a:r>
-          </a:p>
-          <a:p>
-            <a:r>
-              <a:rPr lang="en-US" sz="3200" b="1" dirty="0">
-                <a:solidFill>
-                  <a:srgbClr val="FF0000"/>
-                </a:solidFill>
-              </a:rPr>
-              <a:t>Spread of leisure, the near necessity to enjoy life</a:t>
-            </a:r>
-          </a:p>
-          <a:p>
-            <a:r>
-              <a:rPr lang="en-US" sz="3200" b="1" dirty="0">
-                <a:solidFill>
-                  <a:srgbClr val="FF0000"/>
-                </a:solidFill>
-              </a:rPr>
-              <a:t>Records became cheap and widely available.</a:t>
-            </a:r>
-          </a:p>
-          <a:p>
-            <a:r>
-              <a:rPr lang="en-US" sz="3200" b="1" dirty="0">
-                <a:solidFill>
-                  <a:srgbClr val="FF0000"/>
-                </a:solidFill>
-              </a:rPr>
-              <a:t>The city: noisy, light, busy, young</a:t>
-            </a:r>
-          </a:p>
-        </p:txBody>
-      </p:sp>
-      <p:sp>
-        <p:nvSpPr>
-          <p:cNvPr id="3" name="Title 2"/>
-          <p:cNvSpPr>
-            <a:spLocks noGrp="1"/>
-          </p:cNvSpPr>
-          <p:nvPr>
-            <p:ph type="title"/>
-          </p:nvPr>
-        </p:nvSpPr>
-        <p:spPr/>
-        <p:txBody>
-          <a:bodyPr>
-            <a:normAutofit/>
-          </a:bodyPr>
-          <a:lstStyle/>
-          <a:p>
-            <a:r>
-              <a:rPr lang="en-US" sz="7200" dirty="0"/>
-              <a:t>The audience</a:t>
-            </a:r>
-          </a:p>
-        </p:txBody>
-      </p:sp>
-    </p:spTree>
-    <p:extLst>
-      <p:ext uri="{BB962C8B-B14F-4D97-AF65-F5344CB8AC3E}">
-        <p14:creationId xmlns:p14="http://schemas.microsoft.com/office/powerpoint/2010/main" val="3027439901"/>
       </p:ext>
     </p:extLst>
   </p:cSld>

</xml_diff>

<commit_message>
Moondog Ball, elvis stuff
</commit_message>
<xml_diff>
--- a/HSTR121/ppts/RockEmerges.pptx
+++ b/HSTR121/ppts/RockEmerges.pptx
@@ -5,7 +5,7 @@
     <p:sldMasterId id="2147483648" r:id="rId1"/>
   </p:sldMasterIdLst>
   <p:notesMasterIdLst>
-    <p:notesMasterId r:id="rId22"/>
+    <p:notesMasterId r:id="rId23"/>
   </p:notesMasterIdLst>
   <p:sldIdLst>
     <p:sldId id="256" r:id="rId2"/>
@@ -26,8 +26,9 @@
     <p:sldId id="263" r:id="rId17"/>
     <p:sldId id="262" r:id="rId18"/>
     <p:sldId id="273" r:id="rId19"/>
-    <p:sldId id="274" r:id="rId20"/>
-    <p:sldId id="278" r:id="rId21"/>
+    <p:sldId id="282" r:id="rId20"/>
+    <p:sldId id="274" r:id="rId21"/>
+    <p:sldId id="278" r:id="rId22"/>
   </p:sldIdLst>
   <p:sldSz cx="12192000" cy="6858000"/>
   <p:notesSz cx="6858000" cy="9144000"/>
@@ -220,7 +221,7 @@
           <a:p>
             <a:fld id="{C291D997-D7C6-495A-ADFE-01BE34D636D4}" type="datetimeFigureOut">
               <a:rPr lang="en-US" smtClean="0"/>
-              <a:t>1/19/2018</a:t>
+              <a:t>1/23/2018</a:t>
             </a:fld>
             <a:endParaRPr lang="en-US"/>
           </a:p>
@@ -1041,7 +1042,7 @@
           <a:p>
             <a:fld id="{FBF630C0-B0E4-4EC2-AB0C-BE44B3506280}" type="datetimeFigureOut">
               <a:rPr lang="en-US" smtClean="0"/>
-              <a:t>1/19/2018</a:t>
+              <a:t>1/23/2018</a:t>
             </a:fld>
             <a:endParaRPr lang="en-US"/>
           </a:p>
@@ -1209,7 +1210,7 @@
           <a:p>
             <a:fld id="{FBF630C0-B0E4-4EC2-AB0C-BE44B3506280}" type="datetimeFigureOut">
               <a:rPr lang="en-US" smtClean="0"/>
-              <a:t>1/19/2018</a:t>
+              <a:t>1/23/2018</a:t>
             </a:fld>
             <a:endParaRPr lang="en-US"/>
           </a:p>
@@ -1387,7 +1388,7 @@
           <a:p>
             <a:fld id="{FBF630C0-B0E4-4EC2-AB0C-BE44B3506280}" type="datetimeFigureOut">
               <a:rPr lang="en-US" smtClean="0"/>
-              <a:t>1/19/2018</a:t>
+              <a:t>1/23/2018</a:t>
             </a:fld>
             <a:endParaRPr lang="en-US"/>
           </a:p>
@@ -1555,7 +1556,7 @@
           <a:p>
             <a:fld id="{FBF630C0-B0E4-4EC2-AB0C-BE44B3506280}" type="datetimeFigureOut">
               <a:rPr lang="en-US" smtClean="0"/>
-              <a:t>1/19/2018</a:t>
+              <a:t>1/23/2018</a:t>
             </a:fld>
             <a:endParaRPr lang="en-US"/>
           </a:p>
@@ -1800,7 +1801,7 @@
           <a:p>
             <a:fld id="{FBF630C0-B0E4-4EC2-AB0C-BE44B3506280}" type="datetimeFigureOut">
               <a:rPr lang="en-US" smtClean="0"/>
-              <a:t>1/19/2018</a:t>
+              <a:t>1/23/2018</a:t>
             </a:fld>
             <a:endParaRPr lang="en-US"/>
           </a:p>
@@ -2029,7 +2030,7 @@
           <a:p>
             <a:fld id="{FBF630C0-B0E4-4EC2-AB0C-BE44B3506280}" type="datetimeFigureOut">
               <a:rPr lang="en-US" smtClean="0"/>
-              <a:t>1/19/2018</a:t>
+              <a:t>1/23/2018</a:t>
             </a:fld>
             <a:endParaRPr lang="en-US"/>
           </a:p>
@@ -2393,7 +2394,7 @@
           <a:p>
             <a:fld id="{FBF630C0-B0E4-4EC2-AB0C-BE44B3506280}" type="datetimeFigureOut">
               <a:rPr lang="en-US" smtClean="0"/>
-              <a:t>1/19/2018</a:t>
+              <a:t>1/23/2018</a:t>
             </a:fld>
             <a:endParaRPr lang="en-US"/>
           </a:p>
@@ -2510,7 +2511,7 @@
           <a:p>
             <a:fld id="{FBF630C0-B0E4-4EC2-AB0C-BE44B3506280}" type="datetimeFigureOut">
               <a:rPr lang="en-US" smtClean="0"/>
-              <a:t>1/19/2018</a:t>
+              <a:t>1/23/2018</a:t>
             </a:fld>
             <a:endParaRPr lang="en-US"/>
           </a:p>
@@ -2605,7 +2606,7 @@
           <a:p>
             <a:fld id="{FBF630C0-B0E4-4EC2-AB0C-BE44B3506280}" type="datetimeFigureOut">
               <a:rPr lang="en-US" smtClean="0"/>
-              <a:t>1/19/2018</a:t>
+              <a:t>1/23/2018</a:t>
             </a:fld>
             <a:endParaRPr lang="en-US"/>
           </a:p>
@@ -2880,7 +2881,7 @@
           <a:p>
             <a:fld id="{FBF630C0-B0E4-4EC2-AB0C-BE44B3506280}" type="datetimeFigureOut">
               <a:rPr lang="en-US" smtClean="0"/>
-              <a:t>1/19/2018</a:t>
+              <a:t>1/23/2018</a:t>
             </a:fld>
             <a:endParaRPr lang="en-US"/>
           </a:p>
@@ -3132,7 +3133,7 @@
           <a:p>
             <a:fld id="{FBF630C0-B0E4-4EC2-AB0C-BE44B3506280}" type="datetimeFigureOut">
               <a:rPr lang="en-US" smtClean="0"/>
-              <a:t>1/19/2018</a:t>
+              <a:t>1/23/2018</a:t>
             </a:fld>
             <a:endParaRPr lang="en-US"/>
           </a:p>
@@ -3353,7 +3354,7 @@
           <a:p>
             <a:fld id="{FBF630C0-B0E4-4EC2-AB0C-BE44B3506280}" type="datetimeFigureOut">
               <a:rPr lang="en-US" smtClean="0"/>
-              <a:t>1/19/2018</a:t>
+              <a:t>1/23/2018</a:t>
             </a:fld>
             <a:endParaRPr lang="en-US"/>
           </a:p>
@@ -4984,15 +4985,19 @@
           <a:p>
             <a:r>
               <a:rPr lang="en-US" b="1" dirty="0"/>
-              <a:t>Richard Wayne </a:t>
-            </a:r>
-            <a:r>
-              <a:rPr lang="en-US" b="1" dirty="0" err="1"/>
-              <a:t>Penniman</a:t>
-            </a:r>
-            <a:r>
-              <a:rPr lang="en-US" dirty="0"/>
-              <a:t> (born 1932, Macon, Georgia)</a:t>
+              <a:t>Richard Wayne Penniman</a:t>
+            </a:r>
+            <a:r>
+              <a:rPr lang="en-US" dirty="0"/>
+              <a:t> (born 1932, Macon, Georgia</a:t>
+            </a:r>
+            <a:r>
+              <a:rPr lang="en-US"/>
+              <a:t>), third </a:t>
+            </a:r>
+            <a:r>
+              <a:rPr lang="en-US" dirty="0"/>
+              <a:t>of 12 kids.</a:t>
             </a:r>
           </a:p>
           <a:p>
@@ -5144,19 +5149,26 @@
         </p:spPr>
         <p:txBody>
           <a:bodyPr>
-            <a:normAutofit fontScale="92500" lnSpcReduction="10000"/>
+            <a:normAutofit fontScale="85000" lnSpcReduction="10000"/>
           </a:bodyPr>
           <a:lstStyle/>
           <a:p>
             <a:r>
               <a:rPr lang="en-US" dirty="0"/>
-              <a:t>First important Rock “Disc Jockey</a:t>
-            </a:r>
-            <a:r>
-              <a:rPr lang="en-US"/>
-              <a:t>” (DJ)</a:t>
-            </a:r>
-            <a:endParaRPr lang="en-US" dirty="0"/>
+              <a:t>First important Rock “Disc Jockey” (DJ)</a:t>
+            </a:r>
+          </a:p>
+          <a:p>
+            <a:r>
+              <a:rPr lang="en-US" dirty="0"/>
+              <a:t>High School band: Sultans of Swing</a:t>
+            </a:r>
+          </a:p>
+          <a:p>
+            <a:r>
+              <a:rPr lang="en-US" dirty="0"/>
+              <a:t>DJ on Armed Forces Radio (WWII)</a:t>
+            </a:r>
           </a:p>
           <a:p>
             <a:r>
@@ -5345,93 +5357,56 @@
           <a:chExt cx="0" cy="0"/>
         </a:xfrm>
       </p:grpSpPr>
-      <p:sp>
-        <p:nvSpPr>
-          <p:cNvPr id="2" name="Content Placeholder 1"/>
-          <p:cNvSpPr>
-            <a:spLocks noGrp="1"/>
-          </p:cNvSpPr>
-          <p:nvPr>
-            <p:ph idx="1"/>
-          </p:nvPr>
-        </p:nvSpPr>
-        <p:spPr/>
-        <p:txBody>
-          <a:bodyPr/>
-          <a:lstStyle/>
-          <a:p>
-            <a:r>
-              <a:rPr lang="en-US" dirty="0"/>
-              <a:t>1959: Freed began hosting “The Big Beat” on ABC; popular, but lasted only four episodes.</a:t>
-            </a:r>
-          </a:p>
-          <a:p>
-            <a:r>
-              <a:rPr lang="en-US" dirty="0"/>
-              <a:t>Here is </a:t>
-            </a:r>
-            <a:r>
-              <a:rPr lang="en-US" dirty="0">
-                <a:hlinkClick r:id="rId2"/>
-              </a:rPr>
-              <a:t>why</a:t>
-            </a:r>
-            <a:r>
-              <a:rPr lang="en-US" dirty="0"/>
-              <a:t>: fourth episode featured “Frankie Lyman and the Teenagers”</a:t>
-            </a:r>
-          </a:p>
-          <a:p>
-            <a:r>
-              <a:rPr lang="en-US" dirty="0"/>
-              <a:t>Freed then faced conflict of interest charges for promoting songs in which he  had a financial interest Chuck Berry’s “</a:t>
-            </a:r>
-            <a:r>
-              <a:rPr lang="en-US" dirty="0" err="1"/>
-              <a:t>Maybellene</a:t>
-            </a:r>
-            <a:r>
-              <a:rPr lang="en-US" dirty="0"/>
-              <a:t>”.</a:t>
-            </a:r>
-          </a:p>
-          <a:p>
-            <a:r>
-              <a:rPr lang="en-US" dirty="0"/>
-              <a:t>Common practice, unevenly enforced.</a:t>
-            </a:r>
-          </a:p>
-        </p:txBody>
-      </p:sp>
-      <p:sp>
-        <p:nvSpPr>
-          <p:cNvPr id="3" name="Title 2"/>
-          <p:cNvSpPr>
-            <a:spLocks noGrp="1"/>
-          </p:cNvSpPr>
-          <p:nvPr>
-            <p:ph type="title"/>
-          </p:nvPr>
-        </p:nvSpPr>
-        <p:spPr/>
-        <p:txBody>
-          <a:bodyPr/>
-          <a:lstStyle/>
-          <a:p>
-            <a:r>
-              <a:rPr lang="en-US" b="1" dirty="0">
-                <a:latin typeface="Aharoni" panose="02010803020104030203" pitchFamily="2" charset="-79"/>
-                <a:cs typeface="Aharoni" panose="02010803020104030203" pitchFamily="2" charset="-79"/>
-              </a:rPr>
-              <a:t>Race and Payola</a:t>
-            </a:r>
-          </a:p>
-        </p:txBody>
-      </p:sp>
+      <p:pic>
+        <p:nvPicPr>
+          <p:cNvPr id="3" name="Picture 2" descr="A close up of a newspaper&#10;&#10;Description generated with very high confidence">
+            <a:extLst>
+              <a:ext uri="{FF2B5EF4-FFF2-40B4-BE49-F238E27FC236}">
+                <a16:creationId xmlns:a16="http://schemas.microsoft.com/office/drawing/2014/main" id="{C6A3F1BF-66CC-4B9D-A4CD-2538CAF6FB19}"/>
+              </a:ext>
+            </a:extLst>
+          </p:cNvPr>
+          <p:cNvPicPr>
+            <a:picLocks noChangeAspect="1"/>
+          </p:cNvPicPr>
+          <p:nvPr/>
+        </p:nvPicPr>
+        <p:blipFill>
+          <a:blip r:embed="rId2">
+            <a:extLst>
+              <a:ext uri="{28A0092B-C50C-407E-A947-70E740481C1C}">
+                <a14:useLocalDpi xmlns:a14="http://schemas.microsoft.com/office/drawing/2010/main" val="0"/>
+              </a:ext>
+            </a:extLst>
+          </a:blip>
+          <a:stretch>
+            <a:fillRect/>
+          </a:stretch>
+        </p:blipFill>
+        <p:spPr>
+          <a:xfrm>
+            <a:off x="3443476" y="0"/>
+            <a:ext cx="5719574" cy="6858000"/>
+          </a:xfrm>
+          <a:prstGeom prst="rect">
+            <a:avLst/>
+          </a:prstGeom>
+          <a:ln>
+            <a:noFill/>
+          </a:ln>
+          <a:effectLst>
+            <a:outerShdw blurRad="292100" dist="139700" dir="2700000" algn="tl" rotWithShape="0">
+              <a:srgbClr val="333333">
+                <a:alpha val="65000"/>
+              </a:srgbClr>
+            </a:outerShdw>
+          </a:effectLst>
+        </p:spPr>
+      </p:pic>
     </p:spTree>
     <p:extLst>
       <p:ext uri="{BB962C8B-B14F-4D97-AF65-F5344CB8AC3E}">
-        <p14:creationId xmlns:p14="http://schemas.microsoft.com/office/powerpoint/2010/main" val="1739031549"/>
+        <p14:creationId xmlns:p14="http://schemas.microsoft.com/office/powerpoint/2010/main" val="980561599"/>
       </p:ext>
     </p:extLst>
   </p:cSld>
@@ -5642,6 +5617,119 @@
 </file>
 
 <file path=ppt/slides/slide20.xml><?xml version="1.0" encoding="utf-8"?>
+<p:sld xmlns:a="http://schemas.openxmlformats.org/drawingml/2006/main" xmlns:r="http://schemas.openxmlformats.org/officeDocument/2006/relationships" xmlns:p="http://schemas.openxmlformats.org/presentationml/2006/main">
+  <p:cSld>
+    <p:spTree>
+      <p:nvGrpSpPr>
+        <p:cNvPr id="1" name=""/>
+        <p:cNvGrpSpPr/>
+        <p:nvPr/>
+      </p:nvGrpSpPr>
+      <p:grpSpPr>
+        <a:xfrm>
+          <a:off x="0" y="0"/>
+          <a:ext cx="0" cy="0"/>
+          <a:chOff x="0" y="0"/>
+          <a:chExt cx="0" cy="0"/>
+        </a:xfrm>
+      </p:grpSpPr>
+      <p:sp>
+        <p:nvSpPr>
+          <p:cNvPr id="2" name="Content Placeholder 1"/>
+          <p:cNvSpPr>
+            <a:spLocks noGrp="1"/>
+          </p:cNvSpPr>
+          <p:nvPr>
+            <p:ph idx="1"/>
+          </p:nvPr>
+        </p:nvSpPr>
+        <p:spPr/>
+        <p:txBody>
+          <a:bodyPr/>
+          <a:lstStyle/>
+          <a:p>
+            <a:r>
+              <a:rPr lang="en-US" dirty="0"/>
+              <a:t>1959: Freed began hosting “The Big Beat” on ABC; popular, but lasted only four episodes.</a:t>
+            </a:r>
+          </a:p>
+          <a:p>
+            <a:r>
+              <a:rPr lang="en-US" dirty="0"/>
+              <a:t>Here is </a:t>
+            </a:r>
+            <a:r>
+              <a:rPr lang="en-US" dirty="0">
+                <a:hlinkClick r:id="rId2"/>
+              </a:rPr>
+              <a:t>why</a:t>
+            </a:r>
+            <a:r>
+              <a:rPr lang="en-US" dirty="0"/>
+              <a:t>: fourth episode featured “Frankie Lyman and the Teenagers”</a:t>
+            </a:r>
+          </a:p>
+          <a:p>
+            <a:r>
+              <a:rPr lang="en-US" dirty="0"/>
+              <a:t>Freed then faced conflict of interest charges for promoting songs in which he  had a financial interest Chuck Berry’s “</a:t>
+            </a:r>
+            <a:r>
+              <a:rPr lang="en-US" dirty="0" err="1"/>
+              <a:t>Maybellene</a:t>
+            </a:r>
+            <a:r>
+              <a:rPr lang="en-US" dirty="0"/>
+              <a:t>”.</a:t>
+            </a:r>
+          </a:p>
+          <a:p>
+            <a:r>
+              <a:rPr lang="en-US" dirty="0"/>
+              <a:t>Common practice, unevenly enforced.</a:t>
+            </a:r>
+          </a:p>
+        </p:txBody>
+      </p:sp>
+      <p:sp>
+        <p:nvSpPr>
+          <p:cNvPr id="3" name="Title 2"/>
+          <p:cNvSpPr>
+            <a:spLocks noGrp="1"/>
+          </p:cNvSpPr>
+          <p:nvPr>
+            <p:ph type="title"/>
+          </p:nvPr>
+        </p:nvSpPr>
+        <p:spPr/>
+        <p:txBody>
+          <a:bodyPr/>
+          <a:lstStyle/>
+          <a:p>
+            <a:r>
+              <a:rPr lang="en-US" b="1" dirty="0">
+                <a:latin typeface="Aharoni" panose="02010803020104030203" pitchFamily="2" charset="-79"/>
+                <a:cs typeface="Aharoni" panose="02010803020104030203" pitchFamily="2" charset="-79"/>
+              </a:rPr>
+              <a:t>Race and Payola</a:t>
+            </a:r>
+          </a:p>
+        </p:txBody>
+      </p:sp>
+    </p:spTree>
+    <p:extLst>
+      <p:ext uri="{BB962C8B-B14F-4D97-AF65-F5344CB8AC3E}">
+        <p14:creationId xmlns:p14="http://schemas.microsoft.com/office/powerpoint/2010/main" val="1739031549"/>
+      </p:ext>
+    </p:extLst>
+  </p:cSld>
+  <p:clrMapOvr>
+    <a:masterClrMapping/>
+  </p:clrMapOvr>
+</p:sld>
+</file>
+
+<file path=ppt/slides/slide21.xml><?xml version="1.0" encoding="utf-8"?>
 <p:sld xmlns:a="http://schemas.openxmlformats.org/drawingml/2006/main" xmlns:r="http://schemas.openxmlformats.org/officeDocument/2006/relationships" xmlns:p="http://schemas.openxmlformats.org/presentationml/2006/main">
   <p:cSld>
     <p:spTree>

</xml_diff>